<commit_message>
Added another HJT source screenshot to presentation
</commit_message>
<xml_diff>
--- a/Docs/EECS395.Spring2012.SnyderOneal.InterimReport1Presentation.Instalog.pptx
+++ b/Docs/EECS395.Spring2012.SnyderOneal.InterimReport1Presentation.Instalog.pptx
@@ -4969,13 +4969,8 @@
             </a:r>
             <a:r>
               <a:rPr lang="en-US" dirty="0" smtClean="0"/>
-              <a:t> source </a:t>
-            </a:r>
-            <a:r>
-              <a:rPr lang="en-US" dirty="0" smtClean="0"/>
-              <a:t>code</a:t>
-            </a:r>
-            <a:endParaRPr lang="en-US" dirty="0" smtClean="0"/>
+              <a:t> source code</a:t>
+            </a:r>
           </a:p>
           <a:p>
             <a:r>
@@ -4994,14 +4989,12 @@
               <a:rPr lang="en-US" dirty="0" smtClean="0"/>
               <a:t>Timeline </a:t>
             </a:r>
-            <a:endParaRPr lang="en-US" dirty="0" smtClean="0"/>
           </a:p>
           <a:p>
             <a:r>
               <a:rPr lang="en-US" dirty="0" smtClean="0"/>
               <a:t>Demo</a:t>
             </a:r>
-            <a:endParaRPr lang="en-US" dirty="0" smtClean="0"/>
           </a:p>
           <a:p>
             <a:endParaRPr lang="en-US" dirty="0"/>
@@ -5018,6 +5011,13 @@
   <p:clrMapOvr>
     <a:masterClrMapping/>
   </p:clrMapOvr>
+  <p:timing>
+    <p:tnLst>
+      <p:par>
+        <p:cTn id="1" dur="indefinite" restart="never" nodeType="tmRoot"/>
+      </p:par>
+    </p:tnLst>
+  </p:timing>
 </p:sld>
 </file>
 
@@ -5094,11 +5094,7 @@
           <a:p>
             <a:r>
               <a:rPr lang="en-US" dirty="0" smtClean="0"/>
-              <a:t>Better to start from scratch than from this </a:t>
-            </a:r>
-            <a:r>
-              <a:rPr lang="en-US" dirty="0" smtClean="0"/>
-              <a:t>codebase</a:t>
+              <a:t>Better to start from scratch than from this codebase</a:t>
             </a:r>
           </a:p>
           <a:p>
@@ -5116,6 +5112,13 @@
   <p:clrMapOvr>
     <a:masterClrMapping/>
   </p:clrMapOvr>
+  <p:timing>
+    <p:tnLst>
+      <p:par>
+        <p:cTn id="1" dur="indefinite" restart="never" nodeType="tmRoot"/>
+      </p:par>
+    </p:tnLst>
+  </p:timing>
 </p:sld>
 </file>
 
@@ -5157,7 +5160,7 @@
       </p:sp>
       <p:pic>
         <p:nvPicPr>
-          <p:cNvPr id="1026" name="Picture 2"/>
+          <p:cNvPr id="1027" name="Picture 3"/>
           <p:cNvPicPr>
             <a:picLocks noChangeAspect="1" noChangeArrowheads="1"/>
           </p:cNvPicPr>
@@ -5178,17 +5181,91 @@
         </p:blipFill>
         <p:spPr bwMode="auto">
           <a:xfrm>
-            <a:off x="76200" y="685800"/>
-            <a:ext cx="9012482" cy="5562600"/>
+            <a:off x="457200" y="533400"/>
+            <a:ext cx="6496050" cy="3990975"/>
           </a:xfrm>
           <a:prstGeom prst="rect">
             <a:avLst/>
           </a:prstGeom>
-          <a:noFill/>
           <a:ln>
             <a:noFill/>
           </a:ln>
-          <a:effectLst/>
+          <a:effectLst>
+            <a:outerShdw blurRad="292100" dist="139700" dir="2700000" algn="tl" rotWithShape="0">
+              <a:srgbClr val="333333">
+                <a:alpha val="65000"/>
+              </a:srgbClr>
+            </a:outerShdw>
+          </a:effectLst>
+          <a:extLst>
+            <a:ext uri="{909E8E84-426E-40DD-AFC4-6F175D3DCCD1}">
+              <a14:hiddenFill xmlns:a14="http://schemas.microsoft.com/office/drawing/2010/main">
+                <a:solidFill>
+                  <a:schemeClr val="accent1"/>
+                </a:solidFill>
+              </a14:hiddenFill>
+            </a:ext>
+            <a:ext uri="{91240B29-F687-4F45-9708-019B960494DF}">
+              <a14:hiddenLine xmlns:a14="http://schemas.microsoft.com/office/drawing/2010/main" w="9525">
+                <a:solidFill>
+                  <a:schemeClr val="tx1"/>
+                </a:solidFill>
+                <a:miter lim="800000"/>
+                <a:headEnd/>
+                <a:tailEnd/>
+              </a14:hiddenLine>
+            </a:ext>
+            <a:ext uri="{AF507438-7753-43E0-B8FC-AC1667EBCBE1}">
+              <a14:hiddenEffects xmlns:a14="http://schemas.microsoft.com/office/drawing/2010/main">
+                <a:effectLst>
+                  <a:outerShdw dist="35921" dir="2700000" algn="ctr" rotWithShape="0">
+                    <a:schemeClr val="bg2"/>
+                  </a:outerShdw>
+                </a:effectLst>
+              </a14:hiddenEffects>
+            </a:ext>
+          </a:extLst>
+        </p:spPr>
+      </p:pic>
+      <p:pic>
+        <p:nvPicPr>
+          <p:cNvPr id="3" name="Picture 2"/>
+          <p:cNvPicPr>
+            <a:picLocks noChangeAspect="1" noChangeArrowheads="1"/>
+          </p:cNvPicPr>
+          <p:nvPr/>
+        </p:nvPicPr>
+        <p:blipFill>
+          <a:blip r:embed="rId4">
+            <a:extLst>
+              <a:ext uri="{28A0092B-C50C-407E-A947-70E740481C1C}">
+                <a14:useLocalDpi xmlns:a14="http://schemas.microsoft.com/office/drawing/2010/main" val="0"/>
+              </a:ext>
+            </a:extLst>
+          </a:blip>
+          <a:srcRect/>
+          <a:stretch>
+            <a:fillRect/>
+          </a:stretch>
+        </p:blipFill>
+        <p:spPr bwMode="auto">
+          <a:xfrm>
+            <a:off x="5153025" y="3905250"/>
+            <a:ext cx="3457575" cy="2419350"/>
+          </a:xfrm>
+          <a:prstGeom prst="rect">
+            <a:avLst/>
+          </a:prstGeom>
+          <a:ln>
+            <a:noFill/>
+          </a:ln>
+          <a:effectLst>
+            <a:outerShdw blurRad="292100" dist="139700" dir="2700000" algn="tl" rotWithShape="0">
+              <a:srgbClr val="333333">
+                <a:alpha val="65000"/>
+              </a:srgbClr>
+            </a:outerShdw>
+          </a:effectLst>
           <a:extLst>
             <a:ext uri="{909E8E84-426E-40DD-AFC4-6F175D3DCCD1}">
               <a14:hiddenFill xmlns:a14="http://schemas.microsoft.com/office/drawing/2010/main">
@@ -5229,6 +5306,13 @@
   <p:clrMapOvr>
     <a:masterClrMapping/>
   </p:clrMapOvr>
+  <p:timing>
+    <p:tnLst>
+      <p:par>
+        <p:cTn id="1" dur="indefinite" restart="never" nodeType="tmRoot"/>
+      </p:par>
+    </p:tnLst>
+  </p:timing>
 </p:sld>
 </file>
 
@@ -5307,11 +5391,7 @@
           <a:p>
             <a:r>
               <a:rPr lang="en-US" dirty="0" smtClean="0"/>
-              <a:t>These documents describe the entire </a:t>
-            </a:r>
-            <a:r>
-              <a:rPr lang="en-US" dirty="0" smtClean="0"/>
-              <a:t>project down to the last detail</a:t>
+              <a:t>These documents describe the entire project down to the last detail</a:t>
             </a:r>
             <a:endParaRPr lang="en-US" dirty="0"/>
           </a:p>
@@ -5327,6 +5407,13 @@
   <p:clrMapOvr>
     <a:masterClrMapping/>
   </p:clrMapOvr>
+  <p:timing>
+    <p:tnLst>
+      <p:par>
+        <p:cTn id="1" dur="indefinite" restart="never" nodeType="tmRoot"/>
+      </p:par>
+    </p:tnLst>
+  </p:timing>
 </p:sld>
 </file>
 
@@ -5646,6 +5733,13 @@
   <p:clrMapOvr>
     <a:masterClrMapping/>
   </p:clrMapOvr>
+  <p:timing>
+    <p:tnLst>
+      <p:par>
+        <p:cTn id="1" dur="indefinite" restart="never" nodeType="tmRoot"/>
+      </p:par>
+    </p:tnLst>
+  </p:timing>
 </p:sld>
 </file>
 

</xml_diff>